<commit_message>
edit: Lab6 pdf file
</commit_message>
<xml_diff>
--- a/Lab/6-decision/C-Lab_if.pptx
+++ b/Lab/6-decision/C-Lab_if.pptx
@@ -29,45 +29,45 @@
   <p:notesSz cx="6858000" cy="9144000"/>
   <p:embeddedFontLst>
     <p:embeddedFont>
-      <p:font typeface="Roboto Black" panose="020B0604020202020204" charset="0"/>
-      <p:bold r:id="rId17"/>
-      <p:boldItalic r:id="rId18"/>
+      <p:font typeface="Consolas" panose="020B0609020204030204" pitchFamily="49" charset="0"/>
+      <p:regular r:id="rId17"/>
+      <p:bold r:id="rId18"/>
+      <p:italic r:id="rId19"/>
+      <p:boldItalic r:id="rId20"/>
     </p:embeddedFont>
     <p:embeddedFont>
-      <p:font typeface="Lalezar" panose="00000500000000000000" pitchFamily="2" charset="-78"/>
-      <p:regular r:id="rId19"/>
-    </p:embeddedFont>
-    <p:embeddedFont>
-      <p:font typeface="Bree Serif" panose="020B0604020202020204" charset="0"/>
-      <p:regular r:id="rId20"/>
-    </p:embeddedFont>
-    <p:embeddedFont>
-      <p:font typeface="Dana" panose="020B0604020202020204" charset="-78"/>
+      <p:font typeface="Roboto Thin" panose="020B0604020202020204" charset="0"/>
       <p:regular r:id="rId21"/>
       <p:bold r:id="rId22"/>
       <p:italic r:id="rId23"/>
       <p:boldItalic r:id="rId24"/>
     </p:embeddedFont>
     <p:embeddedFont>
-      <p:font typeface="Roboto Light" panose="020B0604020202020204" charset="0"/>
+      <p:font typeface="Dana" panose="020B0604020202020204" charset="-78"/>
       <p:regular r:id="rId25"/>
       <p:bold r:id="rId26"/>
       <p:italic r:id="rId27"/>
       <p:boldItalic r:id="rId28"/>
     </p:embeddedFont>
     <p:embeddedFont>
-      <p:font typeface="Consolas" panose="020B0609020204030204" pitchFamily="49" charset="0"/>
+      <p:font typeface="Didact Gothic" panose="020B0604020202020204" charset="0"/>
       <p:regular r:id="rId29"/>
-      <p:bold r:id="rId30"/>
-      <p:italic r:id="rId31"/>
-      <p:boldItalic r:id="rId32"/>
     </p:embeddedFont>
     <p:embeddedFont>
-      <p:font typeface="Didact Gothic" panose="020B0604020202020204" charset="0"/>
-      <p:regular r:id="rId33"/>
+      <p:font typeface="Bree Serif" panose="020B0604020202020204" charset="0"/>
+      <p:regular r:id="rId30"/>
     </p:embeddedFont>
     <p:embeddedFont>
-      <p:font typeface="Roboto Thin" panose="020B0604020202020204" charset="0"/>
+      <p:font typeface="Lalezar" panose="00000500000000000000" pitchFamily="2" charset="-78"/>
+      <p:regular r:id="rId31"/>
+    </p:embeddedFont>
+    <p:embeddedFont>
+      <p:font typeface="Roboto Black" panose="020B0604020202020204" charset="0"/>
+      <p:bold r:id="rId32"/>
+      <p:boldItalic r:id="rId33"/>
+    </p:embeddedFont>
+    <p:embeddedFont>
+      <p:font typeface="Roboto Light" panose="020B0604020202020204" charset="0"/>
       <p:regular r:id="rId34"/>
       <p:bold r:id="rId35"/>
       <p:italic r:id="rId36"/>
@@ -425,7 +425,7 @@
           <a:p>
             <a:fld id="{51C35479-EBFD-40F3-9978-325B11083506}" type="datetimeFigureOut">
               <a:rPr lang="en-US" smtClean="0"/>
-              <a:t>3/4/2021</a:t>
+              <a:t>11/11/2021</a:t>
             </a:fld>
             <a:endParaRPr lang="en-US"/>
           </a:p>
@@ -15642,19 +15642,7 @@
                 <a:cs typeface="Lalezar" panose="00000500000000000000" pitchFamily="2" charset="-78"/>
                 <a:sym typeface="Roboto Black"/>
               </a:rPr>
-              <a:t>شش</a:t>
-            </a:r>
-            <a:r>
-              <a:rPr lang="fa-IR" sz="2400" dirty="0" smtClean="0">
-                <a:solidFill>
-                  <a:schemeClr val="accent6"/>
-                </a:solidFill>
-                <a:latin typeface="Lalezar" panose="00000500000000000000" pitchFamily="2" charset="-78"/>
-                <a:ea typeface="Roboto Black"/>
-                <a:cs typeface="Lalezar" panose="00000500000000000000" pitchFamily="2" charset="-78"/>
-                <a:sym typeface="Roboto Black"/>
-              </a:rPr>
-              <a:t>م</a:t>
+              <a:t>ششم</a:t>
             </a:r>
             <a:endParaRPr lang="en-US" sz="2400" dirty="0">
               <a:solidFill>
@@ -20378,7 +20366,29 @@
                 <a:latin typeface="Lalezar" panose="00000500000000000000" pitchFamily="2" charset="-78"/>
                 <a:cs typeface="Lalezar" panose="00000500000000000000" pitchFamily="2" charset="-78"/>
               </a:rPr>
-              <a:t>و اما سوال آخر: به یاد بازی‌ های کودکانه</a:t>
+              <a:t>و اما سوال آخر: به یاد </a:t>
+            </a:r>
+            <a:r>
+              <a:rPr lang="fa-IR" sz="4000" b="0" i="0" u="none" strike="noStrike" dirty="0" smtClean="0">
+                <a:solidFill>
+                  <a:schemeClr val="bg1"/>
+                </a:solidFill>
+                <a:effectLst/>
+                <a:latin typeface="Lalezar" panose="00000500000000000000" pitchFamily="2" charset="-78"/>
+                <a:cs typeface="Lalezar" panose="00000500000000000000" pitchFamily="2" charset="-78"/>
+              </a:rPr>
+              <a:t>بازی‌های </a:t>
+            </a:r>
+            <a:r>
+              <a:rPr lang="fa-IR" sz="4000" b="0" i="0" u="none" strike="noStrike" dirty="0">
+                <a:solidFill>
+                  <a:schemeClr val="bg1"/>
+                </a:solidFill>
+                <a:effectLst/>
+                <a:latin typeface="Lalezar" panose="00000500000000000000" pitchFamily="2" charset="-78"/>
+                <a:cs typeface="Lalezar" panose="00000500000000000000" pitchFamily="2" charset="-78"/>
+              </a:rPr>
+              <a:t>کودکانه</a:t>
             </a:r>
           </a:p>
         </p:txBody>
@@ -28920,7 +28930,27 @@
                 <a:latin typeface="Dana" panose="00000500000000000000" pitchFamily="2" charset="-78"/>
                 <a:cs typeface="Dana" panose="00000500000000000000" pitchFamily="2" charset="-78"/>
               </a:rPr>
-              <a:t>ما هر روز برای انجام هر یک از کارهایمان در حال تصمیم‌گیری هستیم. مثل این که انتخاب کنیم چه غذایی بخوریم و یا آیا لازم هست برای خروج از خانه لباس گرم بپوشیم یا نه. همه‌ی این تصمیم‌گیری‌ها مبتنی بر شرایط خاصی هستند و ممکن است عوض شدن اوضاع، منجر به تغییراتی در تصمیمات ما شود. اهمیت شرط در زندگی کاملا مشهود است و نیازی به بازگو کردن آن نیست؛ پس باید ببینیم چه‌طور می‌توانیم شرط‌های مورد نظرمان را در دنیای کامپیوتر اعمال کنیم.</a:t>
+              <a:t>ما هر روز برای انجام هر یک از کارهایمان در حال تصمیم‌گیری هستیم. مثل این که انتخاب کنیم چه غذایی </a:t>
+            </a:r>
+            <a:r>
+              <a:rPr lang="fa-IR" sz="1600" dirty="0" smtClean="0">
+                <a:solidFill>
+                  <a:schemeClr val="bg1"/>
+                </a:solidFill>
+                <a:latin typeface="Dana" panose="00000500000000000000" pitchFamily="2" charset="-78"/>
+                <a:cs typeface="Dana" panose="00000500000000000000" pitchFamily="2" charset="-78"/>
+              </a:rPr>
+              <a:t>بخوریم؟ </a:t>
+            </a:r>
+            <a:r>
+              <a:rPr lang="fa-IR" sz="1600" dirty="0">
+                <a:solidFill>
+                  <a:schemeClr val="bg1"/>
+                </a:solidFill>
+                <a:latin typeface="Dana" panose="00000500000000000000" pitchFamily="2" charset="-78"/>
+                <a:cs typeface="Dana" panose="00000500000000000000" pitchFamily="2" charset="-78"/>
+              </a:rPr>
+              <a:t>آیا لازم هست برای خروج از خانه لباس گرم بپوشیم یا نه. همه‌ی این تصمیم‌گیری‌ها مبتنی بر شرایط خاصی هستند و ممکن است عوض شدن اوضاع، منجر به تغییراتی در تصمیمات ما شود. اهمیت شرط در زندگی کاملا مشهود است و نیازی به بازگو کردن آن نیست؛ پس باید ببینیم چه‌طور می‌توانیم شرط‌های مورد نظرمان را در دنیای کامپیوتر اعمال کنیم.</a:t>
             </a:r>
           </a:p>
         </p:txBody>
@@ -32920,7 +32950,27 @@
                   <a:latin typeface="Dana" panose="00000500000000000000" pitchFamily="2" charset="-78"/>
                   <a:cs typeface="Dana" panose="00000500000000000000" pitchFamily="2" charset="-78"/>
                 </a:rPr>
-                <a:t>سوال سوم</a:t>
+                <a:t>سوال </a:t>
+              </a:r>
+              <a:r>
+                <a:rPr lang="fa-IR" sz="1000" dirty="0" smtClean="0">
+                  <a:solidFill>
+                    <a:schemeClr val="bg1"/>
+                  </a:solidFill>
+                  <a:latin typeface="Dana" panose="00000500000000000000" pitchFamily="2" charset="-78"/>
+                  <a:cs typeface="Dana" panose="00000500000000000000" pitchFamily="2" charset="-78"/>
+                </a:rPr>
+                <a:t>چهارم</a:t>
+              </a:r>
+              <a:r>
+                <a:rPr lang="fa-IR" sz="1000" dirty="0">
+                  <a:solidFill>
+                    <a:schemeClr val="bg1"/>
+                  </a:solidFill>
+                  <a:latin typeface="Dana" panose="00000500000000000000" pitchFamily="2" charset="-78"/>
+                  <a:cs typeface="Dana" panose="00000500000000000000" pitchFamily="2" charset="-78"/>
+                </a:rPr>
+                <a:t/>
               </a:r>
               <a:br>
                 <a:rPr lang="fa-IR" sz="1000" dirty="0">
@@ -33888,7 +33938,27 @@
                   <a:latin typeface="Dana" panose="00000500000000000000" pitchFamily="2" charset="-78"/>
                   <a:cs typeface="Dana" panose="00000500000000000000" pitchFamily="2" charset="-78"/>
                 </a:rPr>
-                <a:t>سوال چهارم</a:t>
+                <a:t>سوال </a:t>
+              </a:r>
+              <a:r>
+                <a:rPr lang="fa-IR" sz="1000" dirty="0" smtClean="0">
+                  <a:solidFill>
+                    <a:schemeClr val="bg1"/>
+                  </a:solidFill>
+                  <a:latin typeface="Dana" panose="00000500000000000000" pitchFamily="2" charset="-78"/>
+                  <a:cs typeface="Dana" panose="00000500000000000000" pitchFamily="2" charset="-78"/>
+                </a:rPr>
+                <a:t>پنجم</a:t>
+              </a:r>
+              <a:r>
+                <a:rPr lang="fa-IR" sz="1000" dirty="0">
+                  <a:solidFill>
+                    <a:schemeClr val="bg1"/>
+                  </a:solidFill>
+                  <a:latin typeface="Dana" panose="00000500000000000000" pitchFamily="2" charset="-78"/>
+                  <a:cs typeface="Dana" panose="00000500000000000000" pitchFamily="2" charset="-78"/>
+                </a:rPr>
+                <a:t/>
               </a:r>
               <a:br>
                 <a:rPr lang="fa-IR" sz="1000" dirty="0">
@@ -33909,13 +33979,6 @@
                 </a:rPr>
                 <a:t>زنگ تفریح</a:t>
               </a:r>
-              <a:endParaRPr lang="fa-IR" sz="1000" dirty="0">
-                <a:solidFill>
-                  <a:schemeClr val="bg1"/>
-                </a:solidFill>
-                <a:latin typeface="Dana" panose="00000500000000000000" pitchFamily="2" charset="-78"/>
-                <a:cs typeface="Dana" panose="00000500000000000000" pitchFamily="2" charset="-78"/>
-              </a:endParaRPr>
             </a:p>
           </p:txBody>
         </p:sp>
@@ -38116,7 +38179,29 @@
                 <a:latin typeface="Dana" panose="00000500000000000000" pitchFamily="2" charset="-78"/>
                 <a:cs typeface="Dana" panose="00000500000000000000" pitchFamily="2" charset="-78"/>
               </a:rPr>
-              <a:t>به سراغ کد ماشین‌حساب جلسه‌ی قبل بروید که آن را با کمک کدخدا و </a:t>
+              <a:t>به سراغ کد ماشین‌حساب جلسه‌ی قبل بروید که آن را با کمک </a:t>
+            </a:r>
+            <a:r>
+              <a:rPr lang="fa-IR" sz="1600" b="0" i="0" u="none" strike="noStrike" dirty="0" smtClean="0">
+                <a:solidFill>
+                  <a:schemeClr val="bg1"/>
+                </a:solidFill>
+                <a:effectLst/>
+                <a:latin typeface="Dana" panose="00000500000000000000" pitchFamily="2" charset="-78"/>
+                <a:cs typeface="Dana" panose="00000500000000000000" pitchFamily="2" charset="-78"/>
+              </a:rPr>
+              <a:t>کدخدا </a:t>
+            </a:r>
+            <a:r>
+              <a:rPr lang="fa-IR" sz="1600" b="0" i="0" u="none" strike="noStrike" dirty="0">
+                <a:solidFill>
+                  <a:schemeClr val="bg1"/>
+                </a:solidFill>
+                <a:effectLst/>
+                <a:latin typeface="Dana" panose="00000500000000000000" pitchFamily="2" charset="-78"/>
+                <a:cs typeface="Dana" panose="00000500000000000000" pitchFamily="2" charset="-78"/>
+              </a:rPr>
+              <a:t>و </a:t>
             </a:r>
             <a:r>
               <a:rPr lang="en-US" sz="1600" b="0" i="0" u="none" strike="noStrike" dirty="0" err="1" smtClean="0">
@@ -40338,7 +40423,39 @@
                 <a:latin typeface="Lalezar" panose="00000500000000000000" pitchFamily="2" charset="-78"/>
                 <a:cs typeface="Lalezar" panose="00000500000000000000" pitchFamily="2" charset="-78"/>
               </a:rPr>
-              <a:t>سوال دوم: نقطه شرط</a:t>
+              <a:t>سوال </a:t>
+            </a:r>
+            <a:r>
+              <a:rPr lang="fa-IR" sz="4000" dirty="0" smtClean="0">
+                <a:solidFill>
+                  <a:schemeClr val="bg1"/>
+                </a:solidFill>
+                <a:latin typeface="Lalezar" panose="00000500000000000000" pitchFamily="2" charset="-78"/>
+                <a:cs typeface="Lalezar" panose="00000500000000000000" pitchFamily="2" charset="-78"/>
+              </a:rPr>
+              <a:t>سوم</a:t>
+            </a:r>
+            <a:r>
+              <a:rPr lang="fa-IR" sz="4000" b="0" i="0" u="none" strike="noStrike" dirty="0" smtClean="0">
+                <a:solidFill>
+                  <a:schemeClr val="bg1"/>
+                </a:solidFill>
+                <a:effectLst/>
+                <a:latin typeface="Lalezar" panose="00000500000000000000" pitchFamily="2" charset="-78"/>
+                <a:cs typeface="Lalezar" panose="00000500000000000000" pitchFamily="2" charset="-78"/>
+              </a:rPr>
+              <a:t>: </a:t>
+            </a:r>
+            <a:r>
+              <a:rPr lang="fa-IR" sz="4000" b="0" i="0" u="none" strike="noStrike" dirty="0">
+                <a:solidFill>
+                  <a:schemeClr val="bg1"/>
+                </a:solidFill>
+                <a:effectLst/>
+                <a:latin typeface="Lalezar" panose="00000500000000000000" pitchFamily="2" charset="-78"/>
+                <a:cs typeface="Lalezar" panose="00000500000000000000" pitchFamily="2" charset="-78"/>
+              </a:rPr>
+              <a:t>نقطه شرط</a:t>
             </a:r>
           </a:p>
         </p:txBody>
@@ -42080,7 +42197,39 @@
                 <a:latin typeface="Lalezar" panose="00000500000000000000" pitchFamily="2" charset="-78"/>
                 <a:cs typeface="Lalezar" panose="00000500000000000000" pitchFamily="2" charset="-78"/>
               </a:rPr>
-              <a:t>سوال سوم: کم‌تر هم می‌شه؟!</a:t>
+              <a:t>سوال </a:t>
+            </a:r>
+            <a:r>
+              <a:rPr lang="fa-IR" sz="3600" dirty="0" smtClean="0">
+                <a:solidFill>
+                  <a:schemeClr val="bg1"/>
+                </a:solidFill>
+                <a:latin typeface="Lalezar" panose="00000500000000000000" pitchFamily="2" charset="-78"/>
+                <a:cs typeface="Lalezar" panose="00000500000000000000" pitchFamily="2" charset="-78"/>
+              </a:rPr>
+              <a:t>چهارم</a:t>
+            </a:r>
+            <a:r>
+              <a:rPr lang="fa-IR" sz="3600" b="0" i="0" u="none" strike="noStrike" dirty="0" smtClean="0">
+                <a:solidFill>
+                  <a:schemeClr val="bg1"/>
+                </a:solidFill>
+                <a:effectLst/>
+                <a:latin typeface="Lalezar" panose="00000500000000000000" pitchFamily="2" charset="-78"/>
+                <a:cs typeface="Lalezar" panose="00000500000000000000" pitchFamily="2" charset="-78"/>
+              </a:rPr>
+              <a:t>: </a:t>
+            </a:r>
+            <a:r>
+              <a:rPr lang="fa-IR" sz="3600" b="0" i="0" u="none" strike="noStrike" dirty="0">
+                <a:solidFill>
+                  <a:schemeClr val="bg1"/>
+                </a:solidFill>
+                <a:effectLst/>
+                <a:latin typeface="Lalezar" panose="00000500000000000000" pitchFamily="2" charset="-78"/>
+                <a:cs typeface="Lalezar" panose="00000500000000000000" pitchFamily="2" charset="-78"/>
+              </a:rPr>
+              <a:t>کم‌تر هم می‌شه؟!</a:t>
             </a:r>
           </a:p>
         </p:txBody>
@@ -45639,7 +45788,39 @@
                 <a:latin typeface="Lalezar" panose="00000500000000000000" pitchFamily="2" charset="-78"/>
                 <a:cs typeface="Lalezar" panose="00000500000000000000" pitchFamily="2" charset="-78"/>
               </a:rPr>
-              <a:t>سوال چهارم: زنگ تفریح</a:t>
+              <a:t>سوال </a:t>
+            </a:r>
+            <a:r>
+              <a:rPr lang="fa-IR" sz="3600" dirty="0" smtClean="0">
+                <a:solidFill>
+                  <a:schemeClr val="bg1"/>
+                </a:solidFill>
+                <a:latin typeface="Lalezar" panose="00000500000000000000" pitchFamily="2" charset="-78"/>
+                <a:cs typeface="Lalezar" panose="00000500000000000000" pitchFamily="2" charset="-78"/>
+              </a:rPr>
+              <a:t>پنجم</a:t>
+            </a:r>
+            <a:r>
+              <a:rPr lang="fa-IR" sz="3600" b="0" i="0" u="none" strike="noStrike" dirty="0" smtClean="0">
+                <a:solidFill>
+                  <a:schemeClr val="bg1"/>
+                </a:solidFill>
+                <a:effectLst/>
+                <a:latin typeface="Lalezar" panose="00000500000000000000" pitchFamily="2" charset="-78"/>
+                <a:cs typeface="Lalezar" panose="00000500000000000000" pitchFamily="2" charset="-78"/>
+              </a:rPr>
+              <a:t>: </a:t>
+            </a:r>
+            <a:r>
+              <a:rPr lang="fa-IR" sz="3600" b="0" i="0" u="none" strike="noStrike" dirty="0">
+                <a:solidFill>
+                  <a:schemeClr val="bg1"/>
+                </a:solidFill>
+                <a:effectLst/>
+                <a:latin typeface="Lalezar" panose="00000500000000000000" pitchFamily="2" charset="-78"/>
+                <a:cs typeface="Lalezar" panose="00000500000000000000" pitchFamily="2" charset="-78"/>
+              </a:rPr>
+              <a:t>زنگ تفریح</a:t>
             </a:r>
           </a:p>
         </p:txBody>

</xml_diff>